<commit_message>
few changes in presention an report1
</commit_message>
<xml_diff>
--- a/presentation/presentation.pptx
+++ b/presentation/presentation.pptx
@@ -200,7 +200,7 @@
           <a:p>
             <a:fld id="{B2B2B1AB-8F3B-4371-BE6A-4BE4EEDBB0F7}" type="datetimeFigureOut">
               <a:rPr lang="en-US" smtClean="0"/>
-              <a:t>6/15/2022</a:t>
+              <a:t>6/18/2022</a:t>
             </a:fld>
             <a:endParaRPr lang="en-US"/>
           </a:p>
@@ -866,7 +866,7 @@
           <a:p>
             <a:fld id="{1A6112BA-1F94-4EEA-971E-2669F6E51173}" type="datetimeFigureOut">
               <a:rPr lang="en-US" smtClean="0"/>
-              <a:t>6/15/2022</a:t>
+              <a:t>6/18/2022</a:t>
             </a:fld>
             <a:endParaRPr lang="en-US"/>
           </a:p>
@@ -1064,7 +1064,7 @@
           <a:p>
             <a:fld id="{1A6112BA-1F94-4EEA-971E-2669F6E51173}" type="datetimeFigureOut">
               <a:rPr lang="en-US" smtClean="0"/>
-              <a:t>6/15/2022</a:t>
+              <a:t>6/18/2022</a:t>
             </a:fld>
             <a:endParaRPr lang="en-US"/>
           </a:p>
@@ -1272,7 +1272,7 @@
           <a:p>
             <a:fld id="{1A6112BA-1F94-4EEA-971E-2669F6E51173}" type="datetimeFigureOut">
               <a:rPr lang="en-US" smtClean="0"/>
-              <a:t>6/15/2022</a:t>
+              <a:t>6/18/2022</a:t>
             </a:fld>
             <a:endParaRPr lang="en-US"/>
           </a:p>
@@ -1470,7 +1470,7 @@
           <a:p>
             <a:fld id="{1A6112BA-1F94-4EEA-971E-2669F6E51173}" type="datetimeFigureOut">
               <a:rPr lang="en-US" smtClean="0"/>
-              <a:t>6/15/2022</a:t>
+              <a:t>6/18/2022</a:t>
             </a:fld>
             <a:endParaRPr lang="en-US"/>
           </a:p>
@@ -1745,7 +1745,7 @@
           <a:p>
             <a:fld id="{1A6112BA-1F94-4EEA-971E-2669F6E51173}" type="datetimeFigureOut">
               <a:rPr lang="en-US" smtClean="0"/>
-              <a:t>6/15/2022</a:t>
+              <a:t>6/18/2022</a:t>
             </a:fld>
             <a:endParaRPr lang="en-US"/>
           </a:p>
@@ -2010,7 +2010,7 @@
           <a:p>
             <a:fld id="{1A6112BA-1F94-4EEA-971E-2669F6E51173}" type="datetimeFigureOut">
               <a:rPr lang="en-US" smtClean="0"/>
-              <a:t>6/15/2022</a:t>
+              <a:t>6/18/2022</a:t>
             </a:fld>
             <a:endParaRPr lang="en-US"/>
           </a:p>
@@ -2422,7 +2422,7 @@
           <a:p>
             <a:fld id="{1A6112BA-1F94-4EEA-971E-2669F6E51173}" type="datetimeFigureOut">
               <a:rPr lang="en-US" smtClean="0"/>
-              <a:t>6/15/2022</a:t>
+              <a:t>6/18/2022</a:t>
             </a:fld>
             <a:endParaRPr lang="en-US"/>
           </a:p>
@@ -2563,7 +2563,7 @@
           <a:p>
             <a:fld id="{1A6112BA-1F94-4EEA-971E-2669F6E51173}" type="datetimeFigureOut">
               <a:rPr lang="en-US" smtClean="0"/>
-              <a:t>6/15/2022</a:t>
+              <a:t>6/18/2022</a:t>
             </a:fld>
             <a:endParaRPr lang="en-US"/>
           </a:p>
@@ -2676,7 +2676,7 @@
           <a:p>
             <a:fld id="{1A6112BA-1F94-4EEA-971E-2669F6E51173}" type="datetimeFigureOut">
               <a:rPr lang="en-US" smtClean="0"/>
-              <a:t>6/15/2022</a:t>
+              <a:t>6/18/2022</a:t>
             </a:fld>
             <a:endParaRPr lang="en-US"/>
           </a:p>
@@ -2987,7 +2987,7 @@
           <a:p>
             <a:fld id="{1A6112BA-1F94-4EEA-971E-2669F6E51173}" type="datetimeFigureOut">
               <a:rPr lang="en-US" smtClean="0"/>
-              <a:t>6/15/2022</a:t>
+              <a:t>6/18/2022</a:t>
             </a:fld>
             <a:endParaRPr lang="en-US"/>
           </a:p>
@@ -3275,7 +3275,7 @@
           <a:p>
             <a:fld id="{1A6112BA-1F94-4EEA-971E-2669F6E51173}" type="datetimeFigureOut">
               <a:rPr lang="en-US" smtClean="0"/>
-              <a:t>6/15/2022</a:t>
+              <a:t>6/18/2022</a:t>
             </a:fld>
             <a:endParaRPr lang="en-US"/>
           </a:p>
@@ -3516,7 +3516,7 @@
           <a:p>
             <a:fld id="{1A6112BA-1F94-4EEA-971E-2669F6E51173}" type="datetimeFigureOut">
               <a:rPr lang="en-US" smtClean="0"/>
-              <a:t>6/15/2022</a:t>
+              <a:t>6/18/2022</a:t>
             </a:fld>
             <a:endParaRPr lang="en-US"/>
           </a:p>
@@ -3947,7 +3947,7 @@
         </p:nvSpPr>
         <p:spPr>
           <a:xfrm>
-            <a:off x="222740" y="5018391"/>
+            <a:off x="480647" y="5018391"/>
             <a:ext cx="11476891" cy="967060"/>
           </a:xfrm>
           <a:prstGeom prst="rect">
@@ -3989,8 +3989,8 @@
         </p:nvSpPr>
         <p:spPr>
           <a:xfrm>
-            <a:off x="222740" y="1992130"/>
-            <a:ext cx="7549660" cy="2814617"/>
+            <a:off x="222740" y="2471086"/>
+            <a:ext cx="7678616" cy="1891287"/>
           </a:xfrm>
           <a:prstGeom prst="rect">
             <a:avLst/>
@@ -4012,7 +4012,7 @@
               <a:rPr lang="en-US" sz="2000" dirty="0">
                 <a:latin typeface="Calbri"/>
               </a:rPr>
-              <a:t>In the current age, many decisions are made by various programs that use data annotated by humans. These types of decision-making are seemingly sterile and free from prejudice. But we already know that isn’t the case, these types of decision-making created a new type of problem called “Algorithms bias”. For this project, we decided to dig into the field of Algorithms bias and the inequality that follows it.  </a:t>
+              <a:t>Decision-making by software is seemingly sterile and free from prejudice. But that isn’t truly the case, these types of decision-making created a new type of social problem called “Algorithms bias”. For this project, we decided to dig into this field &amp; the inequality that follows it.  </a:t>
             </a:r>
             <a:endParaRPr lang="en-US" sz="2000" dirty="0"/>
           </a:p>
@@ -4445,6 +4445,430 @@
           <a:chExt cx="0" cy="0"/>
         </a:xfrm>
       </p:grpSpPr>
+      <p:sp>
+        <p:nvSpPr>
+          <p:cNvPr id="10" name="TextBox 9">
+            <a:extLst>
+              <a:ext uri="{FF2B5EF4-FFF2-40B4-BE49-F238E27FC236}">
+                <a16:creationId xmlns:a16="http://schemas.microsoft.com/office/drawing/2014/main" id="{48927C25-D57A-360B-4AE1-51ED38A814DA}"/>
+              </a:ext>
+            </a:extLst>
+          </p:cNvPr>
+          <p:cNvSpPr txBox="1"/>
+          <p:nvPr/>
+        </p:nvSpPr>
+        <p:spPr>
+          <a:xfrm>
+            <a:off x="4120662" y="334047"/>
+            <a:ext cx="3950675" cy="830997"/>
+          </a:xfrm>
+          <a:prstGeom prst="rect">
+            <a:avLst/>
+          </a:prstGeom>
+          <a:noFill/>
+        </p:spPr>
+        <p:txBody>
+          <a:bodyPr wrap="square" rtlCol="0">
+            <a:spAutoFit/>
+          </a:bodyPr>
+          <a:lstStyle/>
+          <a:p>
+            <a:r>
+              <a:rPr lang="en-US" sz="4800" dirty="0"/>
+              <a:t>Data Overview </a:t>
+            </a:r>
+          </a:p>
+        </p:txBody>
+      </p:sp>
+      <p:sp>
+        <p:nvSpPr>
+          <p:cNvPr id="11" name="TextBox 10">
+            <a:extLst>
+              <a:ext uri="{FF2B5EF4-FFF2-40B4-BE49-F238E27FC236}">
+                <a16:creationId xmlns:a16="http://schemas.microsoft.com/office/drawing/2014/main" id="{DED6FD7F-A10E-318A-B414-CEFC2E396096}"/>
+              </a:ext>
+            </a:extLst>
+          </p:cNvPr>
+          <p:cNvSpPr txBox="1"/>
+          <p:nvPr/>
+        </p:nvSpPr>
+        <p:spPr>
+          <a:xfrm>
+            <a:off x="656492" y="1512278"/>
+            <a:ext cx="7549661" cy="369332"/>
+          </a:xfrm>
+          <a:prstGeom prst="rect">
+            <a:avLst/>
+          </a:prstGeom>
+          <a:noFill/>
+        </p:spPr>
+        <p:txBody>
+          <a:bodyPr wrap="square" rtlCol="0">
+            <a:spAutoFit/>
+          </a:bodyPr>
+          <a:lstStyle/>
+          <a:p>
+            <a:r>
+              <a:rPr lang="en-US" sz="1800" dirty="0">
+                <a:effectLst/>
+                <a:latin typeface="Calibri" panose="020F0502020204030204" pitchFamily="34" charset="0"/>
+                <a:ea typeface="Calibri" panose="020F0502020204030204" pitchFamily="34" charset="0"/>
+                <a:cs typeface="Arial" panose="020B0604020202020204" pitchFamily="34" charset="0"/>
+              </a:rPr>
+              <a:t>The data we used has been published in an </a:t>
+            </a:r>
+            <a:r>
+              <a:rPr lang="en-US" sz="1800" u="sng" dirty="0">
+                <a:solidFill>
+                  <a:srgbClr val="0563C1"/>
+                </a:solidFill>
+                <a:effectLst/>
+                <a:latin typeface="Calibri" panose="020F0502020204030204" pitchFamily="34" charset="0"/>
+                <a:ea typeface="Calibri" panose="020F0502020204030204" pitchFamily="34" charset="0"/>
+                <a:cs typeface="Arial" panose="020B0604020202020204" pitchFamily="34" charset="0"/>
+                <a:hlinkClick r:id="rId3"/>
+              </a:rPr>
+              <a:t>article</a:t>
+            </a:r>
+            <a:r>
+              <a:rPr lang="en-US" sz="1800" dirty="0">
+                <a:effectLst/>
+                <a:latin typeface="Calibri" panose="020F0502020204030204" pitchFamily="34" charset="0"/>
+                <a:ea typeface="Calibri" panose="020F0502020204030204" pitchFamily="34" charset="0"/>
+                <a:cs typeface="Arial" panose="020B0604020202020204" pitchFamily="34" charset="0"/>
+              </a:rPr>
+              <a:t> from Berkeley University</a:t>
+            </a:r>
+            <a:endParaRPr lang="en-US" dirty="0"/>
+          </a:p>
+        </p:txBody>
+      </p:sp>
+      <mc:AlternateContent xmlns:mc="http://schemas.openxmlformats.org/markup-compatibility/2006">
+        <mc:Choice xmlns:a14="http://schemas.microsoft.com/office/drawing/2010/main" Requires="a14">
+          <p:sp>
+            <p:nvSpPr>
+              <p:cNvPr id="14" name="TextBox 13">
+                <a:extLst>
+                  <a:ext uri="{FF2B5EF4-FFF2-40B4-BE49-F238E27FC236}">
+                    <a16:creationId xmlns:a16="http://schemas.microsoft.com/office/drawing/2014/main" id="{74D90A48-E8E5-7274-E2CE-A8EFAE93E132}"/>
+                  </a:ext>
+                </a:extLst>
+              </p:cNvPr>
+              <p:cNvSpPr txBox="1"/>
+              <p:nvPr/>
+            </p:nvSpPr>
+            <p:spPr>
+              <a:xfrm>
+                <a:off x="656492" y="2228844"/>
+                <a:ext cx="9648093" cy="3966279"/>
+              </a:xfrm>
+              <a:prstGeom prst="rect">
+                <a:avLst/>
+              </a:prstGeom>
+              <a:noFill/>
+            </p:spPr>
+            <p:txBody>
+              <a:bodyPr wrap="square">
+                <a:spAutoFit/>
+              </a:bodyPr>
+              <a:lstStyle/>
+              <a:p>
+                <a:pPr marL="0" marR="0" algn="l" rtl="0">
+                  <a:lnSpc>
+                    <a:spcPct val="150000"/>
+                  </a:lnSpc>
+                  <a:spcBef>
+                    <a:spcPts val="0"/>
+                  </a:spcBef>
+                  <a:spcAft>
+                    <a:spcPts val="800"/>
+                  </a:spcAft>
+                </a:pPr>
+                <a:r>
+                  <a:rPr lang="en-US" sz="1800" dirty="0">
+                    <a:effectLst/>
+                    <a:latin typeface="Calibri" panose="020F0502020204030204" pitchFamily="34" charset="0"/>
+                    <a:ea typeface="Calibri" panose="020F0502020204030204" pitchFamily="34" charset="0"/>
+                    <a:cs typeface="Arial" panose="020B0604020202020204" pitchFamily="34" charset="0"/>
+                  </a:rPr>
+                  <a:t>The way the data was collected – 7912 different annotators rated the data:</a:t>
+                </a:r>
+              </a:p>
+              <a:p>
+                <a:pPr marL="342900" marR="497205" lvl="0" indent="-342900" algn="l" rtl="0">
+                  <a:lnSpc>
+                    <a:spcPct val="150000"/>
+                  </a:lnSpc>
+                  <a:spcBef>
+                    <a:spcPts val="0"/>
+                  </a:spcBef>
+                  <a:spcAft>
+                    <a:spcPts val="800"/>
+                  </a:spcAft>
+                  <a:buFont typeface="Symbol" panose="05050102010706020507" pitchFamily="18" charset="2"/>
+                  <a:buChar char=""/>
+                </a:pPr>
+                <a:r>
+                  <a:rPr lang="en-US" sz="1800" dirty="0">
+                    <a:effectLst/>
+                    <a:latin typeface="Calibri" panose="020F0502020204030204" pitchFamily="34" charset="0"/>
+                    <a:ea typeface="Calibri" panose="020F0502020204030204" pitchFamily="34" charset="0"/>
+                    <a:cs typeface="Arial" panose="020B0604020202020204" pitchFamily="34" charset="0"/>
+                  </a:rPr>
+                  <a:t>Identities of the target group – such as race, religion, gender, sexual orientation, etc.…</a:t>
+                </a:r>
+              </a:p>
+              <a:p>
+                <a:pPr marL="342900" marR="497205" lvl="0" indent="-342900" algn="l" rtl="0">
+                  <a:lnSpc>
+                    <a:spcPct val="150000"/>
+                  </a:lnSpc>
+                  <a:spcBef>
+                    <a:spcPts val="0"/>
+                  </a:spcBef>
+                  <a:spcAft>
+                    <a:spcPts val="800"/>
+                  </a:spcAft>
+                  <a:buFont typeface="Symbol" panose="05050102010706020507" pitchFamily="18" charset="2"/>
+                  <a:buChar char=""/>
+                </a:pPr>
+                <a:r>
+                  <a:rPr lang="en-US" sz="1800" dirty="0">
+                    <a:effectLst/>
+                    <a:latin typeface="Calibri" panose="020F0502020204030204" pitchFamily="34" charset="0"/>
+                    <a:ea typeface="Calibri" panose="020F0502020204030204" pitchFamily="34" charset="0"/>
+                    <a:cs typeface="Arial" panose="020B0604020202020204" pitchFamily="34" charset="0"/>
+                  </a:rPr>
+                  <a:t>Whether the comment is Hate-Speech – </a:t>
+                </a:r>
+                <a14:m>
+                  <m:oMath xmlns:m="http://schemas.openxmlformats.org/officeDocument/2006/math">
+                    <m:d>
+                      <m:dPr>
+                        <m:begChr m:val="{"/>
+                        <m:endChr m:val=""/>
+                        <m:ctrlPr>
+                          <a:rPr lang="en-US" sz="1800" i="1" smtClean="0">
+                            <a:effectLst/>
+                            <a:latin typeface="Cambria Math" panose="02040503050406030204" pitchFamily="18" charset="0"/>
+                            <a:cs typeface="Arial" panose="020B0604020202020204" pitchFamily="34" charset="0"/>
+                          </a:rPr>
+                        </m:ctrlPr>
+                      </m:dPr>
+                      <m:e>
+                        <m:eqArr>
+                          <m:eqArrPr>
+                            <m:ctrlPr>
+                              <a:rPr lang="en-US" sz="1800" i="1" smtClean="0">
+                                <a:effectLst/>
+                                <a:latin typeface="Cambria Math" panose="02040503050406030204" pitchFamily="18" charset="0"/>
+                                <a:cs typeface="Arial" panose="020B0604020202020204" pitchFamily="34" charset="0"/>
+                              </a:rPr>
+                            </m:ctrlPr>
+                          </m:eqArrPr>
+                          <m:e>
+                            <m:r>
+                              <a:rPr lang="en-US" sz="1800" b="0" i="1" smtClean="0">
+                                <a:effectLst/>
+                                <a:latin typeface="Cambria Math" panose="02040503050406030204" pitchFamily="18" charset="0"/>
+                                <a:cs typeface="Arial" panose="020B0604020202020204" pitchFamily="34" charset="0"/>
+                              </a:rPr>
+                              <m:t>0</m:t>
+                            </m:r>
+                            <m:r>
+                              <a:rPr lang="en-US" sz="1800" b="0" i="1" smtClean="0">
+                                <a:effectLst/>
+                                <a:latin typeface="Cambria Math" panose="02040503050406030204" pitchFamily="18" charset="0"/>
+                                <a:cs typeface="Arial" panose="020B0604020202020204" pitchFamily="34" charset="0"/>
+                              </a:rPr>
+                              <m:t>,                </m:t>
+                            </m:r>
+                            <m:r>
+                              <a:rPr lang="en-US" sz="1800" b="0" i="1" smtClean="0">
+                                <a:effectLst/>
+                                <a:latin typeface="Cambria Math" panose="02040503050406030204" pitchFamily="18" charset="0"/>
+                                <a:cs typeface="Arial" panose="020B0604020202020204" pitchFamily="34" charset="0"/>
+                              </a:rPr>
+                              <m:t>𝑛𝑜</m:t>
+                            </m:r>
+                          </m:e>
+                          <m:e>
+                            <m:r>
+                              <a:rPr lang="en-US" sz="1800" b="0" i="1" smtClean="0">
+                                <a:effectLst/>
+                                <a:latin typeface="Cambria Math" panose="02040503050406030204" pitchFamily="18" charset="0"/>
+                                <a:cs typeface="Arial" panose="020B0604020202020204" pitchFamily="34" charset="0"/>
+                              </a:rPr>
+                              <m:t>1</m:t>
+                            </m:r>
+                            <m:r>
+                              <a:rPr lang="en-US" sz="1800" b="0" i="1" smtClean="0">
+                                <a:effectLst/>
+                                <a:latin typeface="Cambria Math" panose="02040503050406030204" pitchFamily="18" charset="0"/>
+                                <a:cs typeface="Arial" panose="020B0604020202020204" pitchFamily="34" charset="0"/>
+                              </a:rPr>
+                              <m:t>,     </m:t>
+                            </m:r>
+                            <m:r>
+                              <a:rPr lang="en-US" sz="1800" b="0" i="1" smtClean="0">
+                                <a:effectLst/>
+                                <a:latin typeface="Cambria Math" panose="02040503050406030204" pitchFamily="18" charset="0"/>
+                                <a:cs typeface="Arial" panose="020B0604020202020204" pitchFamily="34" charset="0"/>
+                              </a:rPr>
+                              <m:t>𝑢𝑛𝑐𝑙𝑒𝑎𝑟</m:t>
+                            </m:r>
+                          </m:e>
+                          <m:e>
+                            <m:r>
+                              <a:rPr lang="en-US" sz="1800" b="0" i="1" smtClean="0">
+                                <a:effectLst/>
+                                <a:latin typeface="Cambria Math" panose="02040503050406030204" pitchFamily="18" charset="0"/>
+                                <a:cs typeface="Arial" panose="020B0604020202020204" pitchFamily="34" charset="0"/>
+                              </a:rPr>
+                              <m:t>2</m:t>
+                            </m:r>
+                            <m:r>
+                              <a:rPr lang="en-US" sz="1800" b="0" i="1" smtClean="0">
+                                <a:effectLst/>
+                                <a:latin typeface="Cambria Math" panose="02040503050406030204" pitchFamily="18" charset="0"/>
+                                <a:cs typeface="Arial" panose="020B0604020202020204" pitchFamily="34" charset="0"/>
+                              </a:rPr>
+                              <m:t>,              </m:t>
+                            </m:r>
+                            <m:r>
+                              <a:rPr lang="en-US" sz="1800" b="0" i="1" smtClean="0">
+                                <a:effectLst/>
+                                <a:latin typeface="Cambria Math" panose="02040503050406030204" pitchFamily="18" charset="0"/>
+                                <a:cs typeface="Arial" panose="020B0604020202020204" pitchFamily="34" charset="0"/>
+                              </a:rPr>
+                              <m:t>𝑦𝑒𝑠</m:t>
+                            </m:r>
+                          </m:e>
+                        </m:eqArr>
+                      </m:e>
+                    </m:d>
+                  </m:oMath>
+                </a14:m>
+                <a:endParaRPr lang="en-US" sz="1800" dirty="0">
+                  <a:effectLst/>
+                  <a:latin typeface="Calibri" panose="020F0502020204030204" pitchFamily="34" charset="0"/>
+                  <a:ea typeface="Calibri" panose="020F0502020204030204" pitchFamily="34" charset="0"/>
+                  <a:cs typeface="Arial" panose="020B0604020202020204" pitchFamily="34" charset="0"/>
+                </a:endParaRPr>
+              </a:p>
+              <a:p>
+                <a:pPr marL="0" marR="0" algn="l" rtl="0">
+                  <a:lnSpc>
+                    <a:spcPct val="150000"/>
+                  </a:lnSpc>
+                  <a:spcBef>
+                    <a:spcPts val="0"/>
+                  </a:spcBef>
+                  <a:spcAft>
+                    <a:spcPts val="800"/>
+                  </a:spcAft>
+                </a:pPr>
+                <a:r>
+                  <a:rPr lang="en-US" sz="1800" dirty="0">
+                    <a:effectLst/>
+                    <a:latin typeface="Calibri" panose="020F0502020204030204" pitchFamily="34" charset="0"/>
+                    <a:ea typeface="Calibri" panose="020F0502020204030204" pitchFamily="34" charset="0"/>
+                    <a:cs typeface="Arial" panose="020B0604020202020204" pitchFamily="34" charset="0"/>
+                  </a:rPr>
+                  <a:t>When finished annotating, the rater was asked to fill in the flowing information about himself:</a:t>
+                </a:r>
+              </a:p>
+              <a:p>
+                <a:pPr marL="342900" marR="0" lvl="0" indent="-342900" algn="l" rtl="0">
+                  <a:lnSpc>
+                    <a:spcPct val="150000"/>
+                  </a:lnSpc>
+                  <a:spcBef>
+                    <a:spcPts val="0"/>
+                  </a:spcBef>
+                  <a:spcAft>
+                    <a:spcPts val="800"/>
+                  </a:spcAft>
+                  <a:buFont typeface="Symbol" panose="05050102010706020507" pitchFamily="18" charset="2"/>
+                  <a:buChar char=""/>
+                </a:pPr>
+                <a:r>
+                  <a:rPr lang="en-US" sz="1800" dirty="0">
+                    <a:effectLst/>
+                    <a:latin typeface="Calibri" panose="020F0502020204030204" pitchFamily="34" charset="0"/>
+                    <a:ea typeface="Calibri" panose="020F0502020204030204" pitchFamily="34" charset="0"/>
+                    <a:cs typeface="Arial" panose="020B0604020202020204" pitchFamily="34" charset="0"/>
+                  </a:rPr>
+                  <a:t>Yearly income, Gender, Political ideology, Race, Religion, Education, and Sexuality.</a:t>
+                </a:r>
+              </a:p>
+              <a:p>
+                <a:pPr marR="497205" lvl="0" algn="l" rtl="0">
+                  <a:lnSpc>
+                    <a:spcPct val="150000"/>
+                  </a:lnSpc>
+                  <a:spcBef>
+                    <a:spcPts val="0"/>
+                  </a:spcBef>
+                  <a:spcAft>
+                    <a:spcPts val="800"/>
+                  </a:spcAft>
+                </a:pPr>
+                <a:endParaRPr lang="en-US" sz="1800" dirty="0">
+                  <a:effectLst/>
+                  <a:latin typeface="Calibri" panose="020F0502020204030204" pitchFamily="34" charset="0"/>
+                  <a:ea typeface="Calibri" panose="020F0502020204030204" pitchFamily="34" charset="0"/>
+                  <a:cs typeface="Arial" panose="020B0604020202020204" pitchFamily="34" charset="0"/>
+                </a:endParaRPr>
+              </a:p>
+            </p:txBody>
+          </p:sp>
+        </mc:Choice>
+        <mc:Fallback>
+          <p:sp>
+            <p:nvSpPr>
+              <p:cNvPr id="14" name="TextBox 13">
+                <a:extLst>
+                  <a:ext uri="{FF2B5EF4-FFF2-40B4-BE49-F238E27FC236}">
+                    <a16:creationId xmlns:a16="http://schemas.microsoft.com/office/drawing/2014/main" id="{74D90A48-E8E5-7274-E2CE-A8EFAE93E132}"/>
+                  </a:ext>
+                </a:extLst>
+              </p:cNvPr>
+              <p:cNvSpPr txBox="1">
+                <a:spLocks noRot="1" noChangeAspect="1" noMove="1" noResize="1" noEditPoints="1" noAdjustHandles="1" noChangeArrowheads="1" noChangeShapeType="1" noTextEdit="1"/>
+              </p:cNvSpPr>
+              <p:nvPr/>
+            </p:nvSpPr>
+            <p:spPr>
+              <a:xfrm>
+                <a:off x="656492" y="2228844"/>
+                <a:ext cx="9648093" cy="3966279"/>
+              </a:xfrm>
+              <a:prstGeom prst="rect">
+                <a:avLst/>
+              </a:prstGeom>
+              <a:blipFill>
+                <a:blip r:embed="rId4"/>
+                <a:stretch>
+                  <a:fillRect l="-569"/>
+                </a:stretch>
+              </a:blipFill>
+            </p:spPr>
+            <p:txBody>
+              <a:bodyPr/>
+              <a:lstStyle/>
+              <a:p>
+                <a:r>
+                  <a:rPr lang="en-US">
+                    <a:noFill/>
+                  </a:rPr>
+                  <a:t> </a:t>
+                </a:r>
+              </a:p>
+            </p:txBody>
+          </p:sp>
+        </mc:Fallback>
+      </mc:AlternateContent>
     </p:spTree>
     <p:extLst>
       <p:ext uri="{BB962C8B-B14F-4D97-AF65-F5344CB8AC3E}">
@@ -4475,53 +4899,199 @@
           <a:chExt cx="0" cy="0"/>
         </a:xfrm>
       </p:grpSpPr>
-      <p:sp>
-        <p:nvSpPr>
-          <p:cNvPr id="2" name="Title 1">
-            <a:extLst>
-              <a:ext uri="{FF2B5EF4-FFF2-40B4-BE49-F238E27FC236}">
-                <a16:creationId xmlns:a16="http://schemas.microsoft.com/office/drawing/2014/main" id="{C7139142-EBB7-5C2B-D979-340307CBE524}"/>
-              </a:ext>
-            </a:extLst>
-          </p:cNvPr>
-          <p:cNvSpPr>
-            <a:spLocks noGrp="1"/>
-          </p:cNvSpPr>
-          <p:nvPr>
-            <p:ph type="title"/>
-          </p:nvPr>
-        </p:nvSpPr>
-        <p:spPr/>
-        <p:txBody>
-          <a:bodyPr/>
-          <a:lstStyle/>
-          <a:p>
-            <a:endParaRPr lang="en-US"/>
-          </a:p>
-        </p:txBody>
-      </p:sp>
-      <p:sp>
-        <p:nvSpPr>
-          <p:cNvPr id="3" name="Content Placeholder 2">
-            <a:extLst>
-              <a:ext uri="{FF2B5EF4-FFF2-40B4-BE49-F238E27FC236}">
-                <a16:creationId xmlns:a16="http://schemas.microsoft.com/office/drawing/2014/main" id="{1F4F8A54-8FA8-B311-F0D7-B09BEE36841E}"/>
-              </a:ext>
-            </a:extLst>
-          </p:cNvPr>
-          <p:cNvSpPr>
-            <a:spLocks noGrp="1"/>
-          </p:cNvSpPr>
-          <p:nvPr>
-            <p:ph idx="1"/>
-          </p:nvPr>
-        </p:nvSpPr>
-        <p:spPr/>
-        <p:txBody>
-          <a:bodyPr/>
-          <a:lstStyle/>
-          <a:p>
-            <a:endParaRPr lang="en-US"/>
+      <p:pic>
+        <p:nvPicPr>
+          <p:cNvPr id="4" name="Picture 3">
+            <a:extLst>
+              <a:ext uri="{FF2B5EF4-FFF2-40B4-BE49-F238E27FC236}">
+                <a16:creationId xmlns:a16="http://schemas.microsoft.com/office/drawing/2014/main" id="{11DC98BA-4956-9814-A0E4-75A0DBB3DDA3}"/>
+              </a:ext>
+            </a:extLst>
+          </p:cNvPr>
+          <p:cNvPicPr>
+            <a:picLocks noChangeAspect="1"/>
+          </p:cNvPicPr>
+          <p:nvPr/>
+        </p:nvPicPr>
+        <p:blipFill>
+          <a:blip r:embed="rId2"/>
+          <a:stretch>
+            <a:fillRect/>
+          </a:stretch>
+        </p:blipFill>
+        <p:spPr>
+          <a:xfrm>
+            <a:off x="117014" y="4103077"/>
+            <a:ext cx="3485518" cy="2151062"/>
+          </a:xfrm>
+          <a:prstGeom prst="rect">
+            <a:avLst/>
+          </a:prstGeom>
+        </p:spPr>
+      </p:pic>
+      <p:pic>
+        <p:nvPicPr>
+          <p:cNvPr id="5" name="Picture 4">
+            <a:extLst>
+              <a:ext uri="{FF2B5EF4-FFF2-40B4-BE49-F238E27FC236}">
+                <a16:creationId xmlns:a16="http://schemas.microsoft.com/office/drawing/2014/main" id="{73670E50-6BEF-63FE-183E-BF947F03AF43}"/>
+              </a:ext>
+            </a:extLst>
+          </p:cNvPr>
+          <p:cNvPicPr>
+            <a:picLocks noChangeAspect="1"/>
+          </p:cNvPicPr>
+          <p:nvPr/>
+        </p:nvPicPr>
+        <p:blipFill>
+          <a:blip r:embed="rId3"/>
+          <a:stretch>
+            <a:fillRect/>
+          </a:stretch>
+        </p:blipFill>
+        <p:spPr>
+          <a:xfrm>
+            <a:off x="4165564" y="4103077"/>
+            <a:ext cx="3485517" cy="2151062"/>
+          </a:xfrm>
+          <a:prstGeom prst="rect">
+            <a:avLst/>
+          </a:prstGeom>
+        </p:spPr>
+      </p:pic>
+      <p:pic>
+        <p:nvPicPr>
+          <p:cNvPr id="6" name="Picture 5">
+            <a:extLst>
+              <a:ext uri="{FF2B5EF4-FFF2-40B4-BE49-F238E27FC236}">
+                <a16:creationId xmlns:a16="http://schemas.microsoft.com/office/drawing/2014/main" id="{037E1A18-4357-88EB-00A7-9EFD307AC689}"/>
+              </a:ext>
+            </a:extLst>
+          </p:cNvPr>
+          <p:cNvPicPr>
+            <a:picLocks noChangeAspect="1"/>
+          </p:cNvPicPr>
+          <p:nvPr/>
+        </p:nvPicPr>
+        <p:blipFill>
+          <a:blip r:embed="rId4"/>
+          <a:stretch>
+            <a:fillRect/>
+          </a:stretch>
+        </p:blipFill>
+        <p:spPr>
+          <a:xfrm>
+            <a:off x="8214114" y="4103077"/>
+            <a:ext cx="3485517" cy="2151062"/>
+          </a:xfrm>
+          <a:prstGeom prst="rect">
+            <a:avLst/>
+          </a:prstGeom>
+        </p:spPr>
+      </p:pic>
+      <p:sp>
+        <p:nvSpPr>
+          <p:cNvPr id="7" name="TextBox 6">
+            <a:extLst>
+              <a:ext uri="{FF2B5EF4-FFF2-40B4-BE49-F238E27FC236}">
+                <a16:creationId xmlns:a16="http://schemas.microsoft.com/office/drawing/2014/main" id="{3F1E5B7A-6958-1A88-D9E8-3A20BB4C2328}"/>
+              </a:ext>
+            </a:extLst>
+          </p:cNvPr>
+          <p:cNvSpPr txBox="1"/>
+          <p:nvPr/>
+        </p:nvSpPr>
+        <p:spPr>
+          <a:xfrm>
+            <a:off x="773506" y="3429000"/>
+            <a:ext cx="11113693" cy="369332"/>
+          </a:xfrm>
+          <a:prstGeom prst="rect">
+            <a:avLst/>
+          </a:prstGeom>
+          <a:noFill/>
+        </p:spPr>
+        <p:txBody>
+          <a:bodyPr wrap="square" rtlCol="0">
+            <a:spAutoFit/>
+          </a:bodyPr>
+          <a:lstStyle/>
+          <a:p>
+            <a:r>
+              <a:rPr lang="en-US" dirty="0"/>
+              <a:t>The Models were fitted with the same features, but The significance coefficients  addressed different targets groups</a:t>
+            </a:r>
+          </a:p>
+        </p:txBody>
+      </p:sp>
+      <p:sp>
+        <p:nvSpPr>
+          <p:cNvPr id="12" name="TextBox 11">
+            <a:extLst>
+              <a:ext uri="{FF2B5EF4-FFF2-40B4-BE49-F238E27FC236}">
+                <a16:creationId xmlns:a16="http://schemas.microsoft.com/office/drawing/2014/main" id="{F222630B-82B9-80D0-F1FA-9FD0F1006E1B}"/>
+              </a:ext>
+            </a:extLst>
+          </p:cNvPr>
+          <p:cNvSpPr txBox="1"/>
+          <p:nvPr/>
+        </p:nvSpPr>
+        <p:spPr>
+          <a:xfrm>
+            <a:off x="4693961" y="925343"/>
+            <a:ext cx="2428722" cy="769441"/>
+          </a:xfrm>
+          <a:prstGeom prst="rect">
+            <a:avLst/>
+          </a:prstGeom>
+          <a:noFill/>
+        </p:spPr>
+        <p:txBody>
+          <a:bodyPr wrap="square" rtlCol="0">
+            <a:spAutoFit/>
+          </a:bodyPr>
+          <a:lstStyle/>
+          <a:p>
+            <a:r>
+              <a:rPr lang="en-US" sz="4400" dirty="0"/>
+              <a:t>Findings</a:t>
+            </a:r>
+            <a:endParaRPr lang="en-US" dirty="0"/>
+          </a:p>
+        </p:txBody>
+      </p:sp>
+      <p:sp>
+        <p:nvSpPr>
+          <p:cNvPr id="13" name="TextBox 12">
+            <a:extLst>
+              <a:ext uri="{FF2B5EF4-FFF2-40B4-BE49-F238E27FC236}">
+                <a16:creationId xmlns:a16="http://schemas.microsoft.com/office/drawing/2014/main" id="{AD19E377-C9D4-3FC8-28CF-27ECB3F0B9E4}"/>
+              </a:ext>
+            </a:extLst>
+          </p:cNvPr>
+          <p:cNvSpPr txBox="1"/>
+          <p:nvPr/>
+        </p:nvSpPr>
+        <p:spPr>
+          <a:xfrm>
+            <a:off x="679560" y="2907296"/>
+            <a:ext cx="6971360" cy="369332"/>
+          </a:xfrm>
+          <a:prstGeom prst="rect">
+            <a:avLst/>
+          </a:prstGeom>
+          <a:noFill/>
+        </p:spPr>
+        <p:txBody>
+          <a:bodyPr wrap="square" rtlCol="0">
+            <a:spAutoFit/>
+          </a:bodyPr>
+          <a:lstStyle/>
+          <a:p>
+            <a:r>
+              <a:rPr lang="en-US" dirty="0"/>
+              <a:t>Better Prediction to hate Speech when focused on </a:t>
+            </a:r>
           </a:p>
         </p:txBody>
       </p:sp>

</xml_diff>